<commit_message>
Added python package architecture for main file
</commit_message>
<xml_diff>
--- a/Structure/structure.pptx
+++ b/Structure/structure.pptx
@@ -3344,6 +3344,16 @@
               <a:t>Type of pipe model</a:t>
             </a:r>
           </a:p>
+          <a:p>
+            <a:pPr marL="285750" indent="-285750">
+              <a:buFont typeface="Arial" panose="020B0604020202020204" pitchFamily="34" charset="0"/>
+              <a:buChar char="•"/>
+            </a:pPr>
+            <a:r>
+              <a:rPr lang="en-US" dirty="0" smtClean="0"/>
+              <a:t>Objective</a:t>
+            </a:r>
+          </a:p>
         </p:txBody>
       </p:sp>
       <p:sp>

</xml_diff>